<commit_message>
updated code with pdf
</commit_message>
<xml_diff>
--- a/Day5/Spring_cloud.pptx
+++ b/Day5/Spring_cloud.pptx
@@ -13,7 +13,6 @@
     <p:sldId id="260" r:id="rId8"/>
     <p:sldId id="261" r:id="rId9"/>
     <p:sldId id="262" r:id="rId10"/>
-    <p:sldId id="263" r:id="rId11"/>
   </p:sldIdLst>
   <p:sldSz cx="12192000" cy="6858000"/>
   <p:notesSz cx="7772400" cy="10058400"/>
@@ -72,7 +71,7 @@
         <p:spPr>
           <a:xfrm>
             <a:off x="838080" y="365040"/>
-            <a:ext cx="10514880" cy="1324800"/>
+            <a:ext cx="10514520" cy="1324440"/>
           </a:xfrm>
           <a:prstGeom prst="rect">
             <a:avLst/>
@@ -103,7 +102,7 @@
         <p:spPr>
           <a:xfrm>
             <a:off x="609480" y="1604520"/>
-            <a:ext cx="10972440" cy="1896840"/>
+            <a:ext cx="10972080" cy="1896840"/>
           </a:xfrm>
           <a:prstGeom prst="rect">
             <a:avLst/>
@@ -133,7 +132,7 @@
         <p:spPr>
           <a:xfrm>
             <a:off x="609480" y="3682080"/>
-            <a:ext cx="10972440" cy="1896840"/>
+            <a:ext cx="10972080" cy="1896840"/>
           </a:xfrm>
           <a:prstGeom prst="rect">
             <a:avLst/>
@@ -185,7 +184,7 @@
         <p:spPr>
           <a:xfrm>
             <a:off x="838080" y="365040"/>
-            <a:ext cx="10514880" cy="1324800"/>
+            <a:ext cx="10514520" cy="1324440"/>
           </a:xfrm>
           <a:prstGeom prst="rect">
             <a:avLst/>
@@ -358,7 +357,7 @@
         <p:spPr>
           <a:xfrm>
             <a:off x="838080" y="365040"/>
-            <a:ext cx="10514880" cy="1324800"/>
+            <a:ext cx="10514520" cy="1324440"/>
           </a:xfrm>
           <a:prstGeom prst="rect">
             <a:avLst/>
@@ -389,7 +388,7 @@
         <p:spPr>
           <a:xfrm>
             <a:off x="609480" y="1604520"/>
-            <a:ext cx="3533040" cy="1896840"/>
+            <a:ext cx="3532680" cy="1896840"/>
           </a:xfrm>
           <a:prstGeom prst="rect">
             <a:avLst/>
@@ -418,8 +417,8 @@
         </p:nvSpPr>
         <p:spPr>
           <a:xfrm>
-            <a:off x="4319640" y="1604520"/>
-            <a:ext cx="3533040" cy="1896840"/>
+            <a:off x="4319280" y="1604520"/>
+            <a:ext cx="3532680" cy="1896840"/>
           </a:xfrm>
           <a:prstGeom prst="rect">
             <a:avLst/>
@@ -448,8 +447,8 @@
         </p:nvSpPr>
         <p:spPr>
           <a:xfrm>
-            <a:off x="8029800" y="1604520"/>
-            <a:ext cx="3533040" cy="1896840"/>
+            <a:off x="8028720" y="1604520"/>
+            <a:ext cx="3532680" cy="1896840"/>
           </a:xfrm>
           <a:prstGeom prst="rect">
             <a:avLst/>
@@ -479,7 +478,7 @@
         <p:spPr>
           <a:xfrm>
             <a:off x="609480" y="3682080"/>
-            <a:ext cx="3533040" cy="1896840"/>
+            <a:ext cx="3532680" cy="1896840"/>
           </a:xfrm>
           <a:prstGeom prst="rect">
             <a:avLst/>
@@ -508,8 +507,8 @@
         </p:nvSpPr>
         <p:spPr>
           <a:xfrm>
-            <a:off x="4319640" y="3682080"/>
-            <a:ext cx="3533040" cy="1896840"/>
+            <a:off x="4319280" y="3682080"/>
+            <a:ext cx="3532680" cy="1896840"/>
           </a:xfrm>
           <a:prstGeom prst="rect">
             <a:avLst/>
@@ -538,8 +537,8 @@
         </p:nvSpPr>
         <p:spPr>
           <a:xfrm>
-            <a:off x="8029800" y="3682080"/>
-            <a:ext cx="3533040" cy="1896840"/>
+            <a:off x="8028720" y="3682080"/>
+            <a:ext cx="3532680" cy="1896840"/>
           </a:xfrm>
           <a:prstGeom prst="rect">
             <a:avLst/>
@@ -613,7 +612,7 @@
         <p:spPr>
           <a:xfrm>
             <a:off x="838080" y="365040"/>
-            <a:ext cx="10514880" cy="1324800"/>
+            <a:ext cx="10514520" cy="1324440"/>
           </a:xfrm>
           <a:prstGeom prst="rect">
             <a:avLst/>
@@ -644,7 +643,7 @@
         <p:spPr>
           <a:xfrm>
             <a:off x="609480" y="1604520"/>
-            <a:ext cx="10972440" cy="3977280"/>
+            <a:ext cx="10972080" cy="3976920"/>
           </a:xfrm>
           <a:prstGeom prst="rect">
             <a:avLst/>
@@ -697,7 +696,7 @@
         <p:spPr>
           <a:xfrm>
             <a:off x="838080" y="365040"/>
-            <a:ext cx="10514880" cy="1324800"/>
+            <a:ext cx="10514520" cy="1324440"/>
           </a:xfrm>
           <a:prstGeom prst="rect">
             <a:avLst/>
@@ -728,7 +727,7 @@
         <p:spPr>
           <a:xfrm>
             <a:off x="609480" y="1604520"/>
-            <a:ext cx="10972440" cy="3977280"/>
+            <a:ext cx="10972080" cy="3976920"/>
           </a:xfrm>
           <a:prstGeom prst="rect">
             <a:avLst/>
@@ -780,7 +779,7 @@
         <p:spPr>
           <a:xfrm>
             <a:off x="838080" y="365040"/>
-            <a:ext cx="10514880" cy="1324800"/>
+            <a:ext cx="10514520" cy="1324440"/>
           </a:xfrm>
           <a:prstGeom prst="rect">
             <a:avLst/>
@@ -811,7 +810,7 @@
         <p:spPr>
           <a:xfrm>
             <a:off x="609480" y="1604520"/>
-            <a:ext cx="5354280" cy="3977280"/>
+            <a:ext cx="5354280" cy="3976920"/>
           </a:xfrm>
           <a:prstGeom prst="rect">
             <a:avLst/>
@@ -841,7 +840,7 @@
         <p:spPr>
           <a:xfrm>
             <a:off x="6231960" y="1604520"/>
-            <a:ext cx="5354280" cy="3977280"/>
+            <a:ext cx="5354280" cy="3976920"/>
           </a:xfrm>
           <a:prstGeom prst="rect">
             <a:avLst/>
@@ -893,7 +892,7 @@
         <p:spPr>
           <a:xfrm>
             <a:off x="838080" y="365040"/>
-            <a:ext cx="10514880" cy="1324800"/>
+            <a:ext cx="10514520" cy="1324440"/>
           </a:xfrm>
           <a:prstGeom prst="rect">
             <a:avLst/>
@@ -946,7 +945,7 @@
         <p:spPr>
           <a:xfrm>
             <a:off x="838080" y="365040"/>
-            <a:ext cx="10514880" cy="6142320"/>
+            <a:ext cx="10514520" cy="6140520"/>
           </a:xfrm>
           <a:prstGeom prst="rect">
             <a:avLst/>
@@ -999,7 +998,7 @@
         <p:spPr>
           <a:xfrm>
             <a:off x="838080" y="365040"/>
-            <a:ext cx="10514880" cy="1324800"/>
+            <a:ext cx="10514520" cy="1324440"/>
           </a:xfrm>
           <a:prstGeom prst="rect">
             <a:avLst/>
@@ -1060,7 +1059,7 @@
         <p:spPr>
           <a:xfrm>
             <a:off x="6231960" y="1604520"/>
-            <a:ext cx="5354280" cy="3977280"/>
+            <a:ext cx="5354280" cy="3976920"/>
           </a:xfrm>
           <a:prstGeom prst="rect">
             <a:avLst/>
@@ -1142,7 +1141,7 @@
         <p:spPr>
           <a:xfrm>
             <a:off x="838080" y="365040"/>
-            <a:ext cx="10514880" cy="1324800"/>
+            <a:ext cx="10514520" cy="1324440"/>
           </a:xfrm>
           <a:prstGeom prst="rect">
             <a:avLst/>
@@ -1173,7 +1172,7 @@
         <p:spPr>
           <a:xfrm>
             <a:off x="609480" y="1604520"/>
-            <a:ext cx="10972440" cy="3977280"/>
+            <a:ext cx="10972080" cy="3976920"/>
           </a:xfrm>
           <a:prstGeom prst="rect">
             <a:avLst/>
@@ -1226,7 +1225,7 @@
         <p:spPr>
           <a:xfrm>
             <a:off x="838080" y="365040"/>
-            <a:ext cx="10514880" cy="1324800"/>
+            <a:ext cx="10514520" cy="1324440"/>
           </a:xfrm>
           <a:prstGeom prst="rect">
             <a:avLst/>
@@ -1257,7 +1256,7 @@
         <p:spPr>
           <a:xfrm>
             <a:off x="609480" y="1604520"/>
-            <a:ext cx="5354280" cy="3977280"/>
+            <a:ext cx="5354280" cy="3976920"/>
           </a:xfrm>
           <a:prstGeom prst="rect">
             <a:avLst/>
@@ -1369,7 +1368,7 @@
         <p:spPr>
           <a:xfrm>
             <a:off x="838080" y="365040"/>
-            <a:ext cx="10514880" cy="1324800"/>
+            <a:ext cx="10514520" cy="1324440"/>
           </a:xfrm>
           <a:prstGeom prst="rect">
             <a:avLst/>
@@ -1460,7 +1459,7 @@
         <p:spPr>
           <a:xfrm>
             <a:off x="609480" y="3682080"/>
-            <a:ext cx="10972440" cy="1896840"/>
+            <a:ext cx="10972080" cy="1896840"/>
           </a:xfrm>
           <a:prstGeom prst="rect">
             <a:avLst/>
@@ -1512,7 +1511,7 @@
         <p:spPr>
           <a:xfrm>
             <a:off x="838080" y="365040"/>
-            <a:ext cx="10514880" cy="1324800"/>
+            <a:ext cx="10514520" cy="1324440"/>
           </a:xfrm>
           <a:prstGeom prst="rect">
             <a:avLst/>
@@ -1543,7 +1542,7 @@
         <p:spPr>
           <a:xfrm>
             <a:off x="609480" y="1604520"/>
-            <a:ext cx="10972440" cy="1896840"/>
+            <a:ext cx="10972080" cy="1896840"/>
           </a:xfrm>
           <a:prstGeom prst="rect">
             <a:avLst/>
@@ -1573,7 +1572,7 @@
         <p:spPr>
           <a:xfrm>
             <a:off x="609480" y="3682080"/>
-            <a:ext cx="10972440" cy="1896840"/>
+            <a:ext cx="10972080" cy="1896840"/>
           </a:xfrm>
           <a:prstGeom prst="rect">
             <a:avLst/>
@@ -1625,7 +1624,7 @@
         <p:spPr>
           <a:xfrm>
             <a:off x="838080" y="365040"/>
-            <a:ext cx="10514880" cy="1324800"/>
+            <a:ext cx="10514520" cy="1324440"/>
           </a:xfrm>
           <a:prstGeom prst="rect">
             <a:avLst/>
@@ -1798,7 +1797,7 @@
         <p:spPr>
           <a:xfrm>
             <a:off x="838080" y="365040"/>
-            <a:ext cx="10514880" cy="1324800"/>
+            <a:ext cx="10514520" cy="1324440"/>
           </a:xfrm>
           <a:prstGeom prst="rect">
             <a:avLst/>
@@ -1829,7 +1828,7 @@
         <p:spPr>
           <a:xfrm>
             <a:off x="609480" y="1604520"/>
-            <a:ext cx="3533040" cy="1896840"/>
+            <a:ext cx="3532680" cy="1896840"/>
           </a:xfrm>
           <a:prstGeom prst="rect">
             <a:avLst/>
@@ -1858,8 +1857,8 @@
         </p:nvSpPr>
         <p:spPr>
           <a:xfrm>
-            <a:off x="4319640" y="1604520"/>
-            <a:ext cx="3533040" cy="1896840"/>
+            <a:off x="4319280" y="1604520"/>
+            <a:ext cx="3532680" cy="1896840"/>
           </a:xfrm>
           <a:prstGeom prst="rect">
             <a:avLst/>
@@ -1888,8 +1887,8 @@
         </p:nvSpPr>
         <p:spPr>
           <a:xfrm>
-            <a:off x="8029800" y="1604520"/>
-            <a:ext cx="3533040" cy="1896840"/>
+            <a:off x="8028720" y="1604520"/>
+            <a:ext cx="3532680" cy="1896840"/>
           </a:xfrm>
           <a:prstGeom prst="rect">
             <a:avLst/>
@@ -1919,7 +1918,7 @@
         <p:spPr>
           <a:xfrm>
             <a:off x="609480" y="3682080"/>
-            <a:ext cx="3533040" cy="1896840"/>
+            <a:ext cx="3532680" cy="1896840"/>
           </a:xfrm>
           <a:prstGeom prst="rect">
             <a:avLst/>
@@ -1948,8 +1947,8 @@
         </p:nvSpPr>
         <p:spPr>
           <a:xfrm>
-            <a:off x="4319640" y="3682080"/>
-            <a:ext cx="3533040" cy="1896840"/>
+            <a:off x="4319280" y="3682080"/>
+            <a:ext cx="3532680" cy="1896840"/>
           </a:xfrm>
           <a:prstGeom prst="rect">
             <a:avLst/>
@@ -1978,8 +1977,8 @@
         </p:nvSpPr>
         <p:spPr>
           <a:xfrm>
-            <a:off x="8029800" y="3682080"/>
-            <a:ext cx="3533040" cy="1896840"/>
+            <a:off x="8028720" y="3682080"/>
+            <a:ext cx="3532680" cy="1896840"/>
           </a:xfrm>
           <a:prstGeom prst="rect">
             <a:avLst/>
@@ -2031,7 +2030,7 @@
         <p:spPr>
           <a:xfrm>
             <a:off x="838080" y="365040"/>
-            <a:ext cx="10514880" cy="1324800"/>
+            <a:ext cx="10514520" cy="1324440"/>
           </a:xfrm>
           <a:prstGeom prst="rect">
             <a:avLst/>
@@ -2062,7 +2061,7 @@
         <p:spPr>
           <a:xfrm>
             <a:off x="609480" y="1604520"/>
-            <a:ext cx="10972440" cy="3977280"/>
+            <a:ext cx="10972080" cy="3976920"/>
           </a:xfrm>
           <a:prstGeom prst="rect">
             <a:avLst/>
@@ -2114,7 +2113,7 @@
         <p:spPr>
           <a:xfrm>
             <a:off x="838080" y="365040"/>
-            <a:ext cx="10514880" cy="1324800"/>
+            <a:ext cx="10514520" cy="1324440"/>
           </a:xfrm>
           <a:prstGeom prst="rect">
             <a:avLst/>
@@ -2145,7 +2144,7 @@
         <p:spPr>
           <a:xfrm>
             <a:off x="609480" y="1604520"/>
-            <a:ext cx="5354280" cy="3977280"/>
+            <a:ext cx="5354280" cy="3976920"/>
           </a:xfrm>
           <a:prstGeom prst="rect">
             <a:avLst/>
@@ -2175,7 +2174,7 @@
         <p:spPr>
           <a:xfrm>
             <a:off x="6231960" y="1604520"/>
-            <a:ext cx="5354280" cy="3977280"/>
+            <a:ext cx="5354280" cy="3976920"/>
           </a:xfrm>
           <a:prstGeom prst="rect">
             <a:avLst/>
@@ -2227,7 +2226,7 @@
         <p:spPr>
           <a:xfrm>
             <a:off x="838080" y="365040"/>
-            <a:ext cx="10514880" cy="1324800"/>
+            <a:ext cx="10514520" cy="1324440"/>
           </a:xfrm>
           <a:prstGeom prst="rect">
             <a:avLst/>
@@ -2280,7 +2279,7 @@
         <p:spPr>
           <a:xfrm>
             <a:off x="838080" y="365040"/>
-            <a:ext cx="10514880" cy="6142320"/>
+            <a:ext cx="10514520" cy="6140520"/>
           </a:xfrm>
           <a:prstGeom prst="rect">
             <a:avLst/>
@@ -2333,7 +2332,7 @@
         <p:spPr>
           <a:xfrm>
             <a:off x="838080" y="365040"/>
-            <a:ext cx="10514880" cy="1324800"/>
+            <a:ext cx="10514520" cy="1324440"/>
           </a:xfrm>
           <a:prstGeom prst="rect">
             <a:avLst/>
@@ -2394,7 +2393,7 @@
         <p:spPr>
           <a:xfrm>
             <a:off x="6231960" y="1604520"/>
-            <a:ext cx="5354280" cy="3977280"/>
+            <a:ext cx="5354280" cy="3976920"/>
           </a:xfrm>
           <a:prstGeom prst="rect">
             <a:avLst/>
@@ -2476,7 +2475,7 @@
         <p:spPr>
           <a:xfrm>
             <a:off x="838080" y="365040"/>
-            <a:ext cx="10514880" cy="1324800"/>
+            <a:ext cx="10514520" cy="1324440"/>
           </a:xfrm>
           <a:prstGeom prst="rect">
             <a:avLst/>
@@ -2507,7 +2506,7 @@
         <p:spPr>
           <a:xfrm>
             <a:off x="609480" y="1604520"/>
-            <a:ext cx="5354280" cy="3977280"/>
+            <a:ext cx="5354280" cy="3976920"/>
           </a:xfrm>
           <a:prstGeom prst="rect">
             <a:avLst/>
@@ -2619,7 +2618,7 @@
         <p:spPr>
           <a:xfrm>
             <a:off x="838080" y="365040"/>
-            <a:ext cx="10514880" cy="1324800"/>
+            <a:ext cx="10514520" cy="1324440"/>
           </a:xfrm>
           <a:prstGeom prst="rect">
             <a:avLst/>
@@ -2710,7 +2709,7 @@
         <p:spPr>
           <a:xfrm>
             <a:off x="609480" y="3682080"/>
-            <a:ext cx="10972440" cy="1896840"/>
+            <a:ext cx="10972080" cy="1896840"/>
           </a:xfrm>
           <a:prstGeom prst="rect">
             <a:avLst/>
@@ -2769,7 +2768,7 @@
         <p:spPr>
           <a:xfrm>
             <a:off x="838080" y="365040"/>
-            <a:ext cx="10514880" cy="1324800"/>
+            <a:ext cx="10514520" cy="1324440"/>
           </a:xfrm>
           <a:prstGeom prst="rect">
             <a:avLst/>
@@ -2806,7 +2805,7 @@
         <p:spPr>
           <a:xfrm>
             <a:off x="609480" y="1604520"/>
-            <a:ext cx="10972440" cy="3977280"/>
+            <a:ext cx="10972080" cy="3976920"/>
           </a:xfrm>
           <a:prstGeom prst="rect">
             <a:avLst/>
@@ -2817,7 +2816,7 @@
             <a:normAutofit/>
           </a:bodyPr>
           <a:p>
-            <a:pPr marL="432000" indent="-324000">
+            <a:pPr marL="432000" indent="-324000" algn="ctr">
               <a:spcBef>
                 <a:spcPts val="1417"/>
               </a:spcBef>
@@ -2829,17 +2828,17 @@
               <a:buChar char=""/>
             </a:pPr>
             <a:r>
-              <a:rPr b="0" lang="en-US" sz="3200" spc="-1" strike="noStrike">
+              <a:rPr b="0" lang="en-US" sz="1800" spc="-1" strike="noStrike">
                 <a:latin typeface="Arial"/>
               </a:rPr>
               <a:t>Click to edit the outline text format</a:t>
             </a:r>
-            <a:endParaRPr b="0" lang="en-US" sz="3200" spc="-1" strike="noStrike">
-              <a:latin typeface="Arial"/>
-            </a:endParaRPr>
-          </a:p>
-          <a:p>
-            <a:pPr lvl="1" marL="864000" indent="-324000">
+            <a:endParaRPr b="0" lang="en-US" sz="1800" spc="-1" strike="noStrike">
+              <a:latin typeface="Arial"/>
+            </a:endParaRPr>
+          </a:p>
+          <a:p>
+            <a:pPr lvl="1" marL="864000" indent="-324000" algn="ctr">
               <a:spcBef>
                 <a:spcPts val="1134"/>
               </a:spcBef>
@@ -2851,17 +2850,17 @@
               <a:buChar char=""/>
             </a:pPr>
             <a:r>
-              <a:rPr b="0" lang="en-US" sz="2800" spc="-1" strike="noStrike">
+              <a:rPr b="0" lang="en-US" sz="1800" spc="-1" strike="noStrike">
                 <a:latin typeface="Arial"/>
               </a:rPr>
               <a:t>Second Outline Level</a:t>
             </a:r>
-            <a:endParaRPr b="0" lang="en-US" sz="2800" spc="-1" strike="noStrike">
-              <a:latin typeface="Arial"/>
-            </a:endParaRPr>
-          </a:p>
-          <a:p>
-            <a:pPr lvl="2" marL="1296000" indent="-288000">
+            <a:endParaRPr b="0" lang="en-US" sz="1800" spc="-1" strike="noStrike">
+              <a:latin typeface="Arial"/>
+            </a:endParaRPr>
+          </a:p>
+          <a:p>
+            <a:pPr lvl="2" marL="1296000" indent="-288000" algn="ctr">
               <a:spcBef>
                 <a:spcPts val="850"/>
               </a:spcBef>
@@ -2873,17 +2872,17 @@
               <a:buChar char=""/>
             </a:pPr>
             <a:r>
-              <a:rPr b="0" lang="en-US" sz="2400" spc="-1" strike="noStrike">
+              <a:rPr b="0" lang="en-US" sz="1800" spc="-1" strike="noStrike">
                 <a:latin typeface="Arial"/>
               </a:rPr>
               <a:t>Third Outline Level</a:t>
             </a:r>
-            <a:endParaRPr b="0" lang="en-US" sz="2400" spc="-1" strike="noStrike">
-              <a:latin typeface="Arial"/>
-            </a:endParaRPr>
-          </a:p>
-          <a:p>
-            <a:pPr lvl="3" marL="1728000" indent="-216000">
+            <a:endParaRPr b="0" lang="en-US" sz="1800" spc="-1" strike="noStrike">
+              <a:latin typeface="Arial"/>
+            </a:endParaRPr>
+          </a:p>
+          <a:p>
+            <a:pPr lvl="3" marL="1728000" indent="-216000" algn="ctr">
               <a:spcBef>
                 <a:spcPts val="567"/>
               </a:spcBef>
@@ -2895,17 +2894,17 @@
               <a:buChar char=""/>
             </a:pPr>
             <a:r>
-              <a:rPr b="0" lang="en-US" sz="2000" spc="-1" strike="noStrike">
+              <a:rPr b="0" lang="en-US" sz="1800" spc="-1" strike="noStrike">
                 <a:latin typeface="Arial"/>
               </a:rPr>
               <a:t>Fourth Outline Level</a:t>
             </a:r>
-            <a:endParaRPr b="0" lang="en-US" sz="2000" spc="-1" strike="noStrike">
-              <a:latin typeface="Arial"/>
-            </a:endParaRPr>
-          </a:p>
-          <a:p>
-            <a:pPr lvl="4" marL="2160000" indent="-216000">
+            <a:endParaRPr b="0" lang="en-US" sz="1800" spc="-1" strike="noStrike">
+              <a:latin typeface="Arial"/>
+            </a:endParaRPr>
+          </a:p>
+          <a:p>
+            <a:pPr lvl="4" marL="2160000" indent="-216000" algn="ctr">
               <a:spcBef>
                 <a:spcPts val="283"/>
               </a:spcBef>
@@ -2917,17 +2916,17 @@
               <a:buChar char=""/>
             </a:pPr>
             <a:r>
-              <a:rPr b="0" lang="en-US" sz="2000" spc="-1" strike="noStrike">
+              <a:rPr b="0" lang="en-US" sz="1800" spc="-1" strike="noStrike">
                 <a:latin typeface="Arial"/>
               </a:rPr>
               <a:t>Fifth Outline Level</a:t>
             </a:r>
-            <a:endParaRPr b="0" lang="en-US" sz="2000" spc="-1" strike="noStrike">
-              <a:latin typeface="Arial"/>
-            </a:endParaRPr>
-          </a:p>
-          <a:p>
-            <a:pPr lvl="5" marL="2592000" indent="-216000">
+            <a:endParaRPr b="0" lang="en-US" sz="1800" spc="-1" strike="noStrike">
+              <a:latin typeface="Arial"/>
+            </a:endParaRPr>
+          </a:p>
+          <a:p>
+            <a:pPr lvl="5" marL="2592000" indent="-216000" algn="ctr">
               <a:spcBef>
                 <a:spcPts val="283"/>
               </a:spcBef>
@@ -2939,17 +2938,17 @@
               <a:buChar char=""/>
             </a:pPr>
             <a:r>
-              <a:rPr b="0" lang="en-US" sz="2000" spc="-1" strike="noStrike">
+              <a:rPr b="0" lang="en-US" sz="1800" spc="-1" strike="noStrike">
                 <a:latin typeface="Arial"/>
               </a:rPr>
               <a:t>Sixth Outline Level</a:t>
             </a:r>
-            <a:endParaRPr b="0" lang="en-US" sz="2000" spc="-1" strike="noStrike">
-              <a:latin typeface="Arial"/>
-            </a:endParaRPr>
-          </a:p>
-          <a:p>
-            <a:pPr lvl="6" marL="3024000" indent="-216000">
+            <a:endParaRPr b="0" lang="en-US" sz="1800" spc="-1" strike="noStrike">
+              <a:latin typeface="Arial"/>
+            </a:endParaRPr>
+          </a:p>
+          <a:p>
+            <a:pPr lvl="6" marL="3024000" indent="-216000" algn="ctr">
               <a:spcBef>
                 <a:spcPts val="283"/>
               </a:spcBef>
@@ -2961,12 +2960,12 @@
               <a:buChar char=""/>
             </a:pPr>
             <a:r>
-              <a:rPr b="0" lang="en-US" sz="2000" spc="-1" strike="noStrike">
+              <a:rPr b="0" lang="en-US" sz="1800" spc="-1" strike="noStrike">
                 <a:latin typeface="Arial"/>
               </a:rPr>
               <a:t>Seventh Outline Level</a:t>
             </a:r>
-            <a:endParaRPr b="0" lang="en-US" sz="2000" spc="-1" strike="noStrike">
+            <a:endParaRPr b="0" lang="en-US" sz="1800" spc="-1" strike="noStrike">
               <a:latin typeface="Arial"/>
             </a:endParaRPr>
           </a:p>
@@ -3278,7 +3277,7 @@
         <p:spPr>
           <a:xfrm>
             <a:off x="1523880" y="1122480"/>
-            <a:ext cx="9143280" cy="2386800"/>
+            <a:ext cx="9142920" cy="2386440"/>
           </a:xfrm>
           <a:prstGeom prst="rect">
             <a:avLst/>
@@ -3310,6 +3309,7 @@
                   <a:srgbClr val="000000"/>
                 </a:solidFill>
                 <a:latin typeface="Calibri Light"/>
+                <a:ea typeface="DejaVu Sans"/>
               </a:rPr>
               <a:t>Zuul</a:t>
             </a:r>
@@ -3358,7 +3358,7 @@
         <p:spPr>
           <a:xfrm>
             <a:off x="838080" y="365040"/>
-            <a:ext cx="10514880" cy="1324800"/>
+            <a:ext cx="10514520" cy="1324440"/>
           </a:xfrm>
           <a:prstGeom prst="rect">
             <a:avLst/>
@@ -3390,6 +3390,7 @@
                   <a:srgbClr val="000000"/>
                 </a:solidFill>
                 <a:latin typeface="Calibri Light"/>
+                <a:ea typeface="DejaVu Sans"/>
               </a:rPr>
               <a:t>Definition</a:t>
             </a:r>
@@ -3408,7 +3409,7 @@
         <p:spPr>
           <a:xfrm>
             <a:off x="838080" y="1825560"/>
-            <a:ext cx="10514880" cy="4350600"/>
+            <a:ext cx="10514520" cy="4350240"/>
           </a:xfrm>
           <a:prstGeom prst="rect">
             <a:avLst/>
@@ -3443,6 +3444,7 @@
                   <a:srgbClr val="000000"/>
                 </a:solidFill>
                 <a:latin typeface="Calibri"/>
+                <a:ea typeface="DejaVu Sans"/>
               </a:rPr>
               <a:t>Zuul is an edge service that proxies requests to multiple backing services. It provides a unified “front door” to your system, which allows a browser, mobile app, or other user interface to consume services from multiple hosts without managing cross-origin resource sharing (CORS) and authentication for each one</a:t>
             </a:r>
@@ -3495,7 +3497,7 @@
         <p:spPr>
           <a:xfrm>
             <a:off x="2932200" y="1429200"/>
-            <a:ext cx="4657320" cy="2685600"/>
+            <a:ext cx="4656960" cy="2685240"/>
           </a:xfrm>
           <a:prstGeom prst="rect">
             <a:avLst/>
@@ -3544,7 +3546,7 @@
         <p:spPr>
           <a:xfrm>
             <a:off x="838080" y="365040"/>
-            <a:ext cx="1264680" cy="1189080"/>
+            <a:ext cx="1264320" cy="1188720"/>
           </a:xfrm>
           <a:prstGeom prst="rect">
             <a:avLst/>
@@ -3576,6 +3578,7 @@
                   <a:srgbClr val="000000"/>
                 </a:solidFill>
                 <a:latin typeface="Calibri"/>
+                <a:ea typeface="DejaVu Sans"/>
               </a:rPr>
               <a:t>Server</a:t>
             </a:r>
@@ -3594,7 +3597,7 @@
         <p:spPr>
           <a:xfrm>
             <a:off x="731520" y="1188720"/>
-            <a:ext cx="10514880" cy="4350600"/>
+            <a:ext cx="10514520" cy="4350240"/>
           </a:xfrm>
           <a:prstGeom prst="rect">
             <a:avLst/>
@@ -3615,6 +3618,11 @@
             <a:noAutofit/>
           </a:bodyPr>
           <a:p>
+            <a:pPr>
+              <a:lnSpc>
+                <a:spcPct val="100000"/>
+              </a:lnSpc>
+            </a:pPr>
             <a:r>
               <a:rPr b="0" lang="en-US" sz="1000" spc="-1" strike="noStrike">
                 <a:solidFill>
@@ -3823,6 +3831,11 @@
             </a:endParaRPr>
           </a:p>
           <a:p>
+            <a:pPr>
+              <a:lnSpc>
+                <a:spcPct val="100000"/>
+              </a:lnSpc>
+            </a:pPr>
             <a:r>
               <a:rPr b="0" lang="sv-SE" sz="1000" spc="-1" strike="noStrike">
                 <a:solidFill>
@@ -3966,6 +3979,11 @@
             </a:endParaRPr>
           </a:p>
           <a:p>
+            <a:pPr>
+              <a:lnSpc>
+                <a:spcPct val="100000"/>
+              </a:lnSpc>
+            </a:pPr>
             <a:r>
               <a:rPr b="0" lang="en-US" sz="1000" spc="-1" strike="noStrike">
                 <a:solidFill>
@@ -4297,7 +4315,7 @@
         <p:spPr>
           <a:xfrm>
             <a:off x="28080" y="66600"/>
-            <a:ext cx="12191760" cy="6758640"/>
+            <a:ext cx="12191400" cy="6758280"/>
           </a:xfrm>
           <a:prstGeom prst="rect">
             <a:avLst/>
@@ -4350,7 +4368,7 @@
         <p:spPr>
           <a:xfrm>
             <a:off x="640080" y="461880"/>
-            <a:ext cx="5266800" cy="1142640"/>
+            <a:ext cx="5266440" cy="1142280"/>
           </a:xfrm>
           <a:prstGeom prst="rect">
             <a:avLst/>
@@ -4373,7 +4391,7 @@
         <p:spPr>
           <a:xfrm>
             <a:off x="718560" y="1737360"/>
-            <a:ext cx="6048000" cy="1504440"/>
+            <a:ext cx="6047640" cy="1504080"/>
           </a:xfrm>
           <a:prstGeom prst="rect">
             <a:avLst/>
@@ -4396,7 +4414,7 @@
         <p:spPr>
           <a:xfrm>
             <a:off x="709560" y="2834640"/>
-            <a:ext cx="6879960" cy="1929960"/>
+            <a:ext cx="6879600" cy="1929600"/>
           </a:xfrm>
           <a:prstGeom prst="rect">
             <a:avLst/>
@@ -4438,74 +4456,14 @@
       </p:grpSpPr>
       <p:sp>
         <p:nvSpPr>
-          <p:cNvPr id="86" name="TextShape 1"/>
-          <p:cNvSpPr txBox="1"/>
-          <p:nvPr/>
-        </p:nvSpPr>
-        <p:spPr>
-          <a:xfrm>
-            <a:off x="609480" y="1604520"/>
-            <a:ext cx="10972440" cy="3977280"/>
-          </a:xfrm>
-          <a:prstGeom prst="rect">
-            <a:avLst/>
-          </a:prstGeom>
-          <a:noFill/>
-          <a:ln>
-            <a:noFill/>
-          </a:ln>
-        </p:spPr>
-        <p:txBody>
-          <a:bodyPr lIns="0" rIns="0" tIns="0" bIns="0">
-            <a:normAutofit/>
-          </a:bodyPr>
-          <a:p>
-            <a:endParaRPr b="0" lang="en-US" sz="3200" spc="-1" strike="noStrike">
-              <a:latin typeface="Arial"/>
-            </a:endParaRPr>
-          </a:p>
-        </p:txBody>
-      </p:sp>
-    </p:spTree>
-  </p:cSld>
-  <mc:AlternateContent>
-    <mc:Choice Requires="p14">
-      <p:transition spd="slow" p14:dur="2000"/>
-    </mc:Choice>
-    <mc:Fallback>
-      <p:transition spd="slow"/>
-    </mc:Fallback>
-  </mc:AlternateContent>
-</p:sld>
-</file>
-
-<file path=ppt/slides/slide8.xml><?xml version="1.0" encoding="utf-8"?>
-<p:sld xmlns:a="http://schemas.openxmlformats.org/drawingml/2006/main" xmlns:p="http://schemas.openxmlformats.org/presentationml/2006/main" xmlns:r="http://schemas.openxmlformats.org/officeDocument/2006/relationships" xmlns:p14="http://schemas.microsoft.com/office/powerpoint/2010/main" xmlns:p15="http://schemas.microsoft.com/office/powerpoint/2012/main" xmlns:mc="http://schemas.openxmlformats.org/markup-compatibility/2006">
-  <p:cSld>
-    <p:spTree>
-      <p:nvGrpSpPr>
-        <p:cNvPr id="1" name=""/>
-        <p:cNvGrpSpPr/>
-        <p:nvPr/>
-      </p:nvGrpSpPr>
-      <p:grpSpPr>
-        <a:xfrm>
-          <a:off x="0" y="0"/>
-          <a:ext cx="0" cy="0"/>
-          <a:chOff x="0" y="0"/>
-          <a:chExt cx="0" cy="0"/>
-        </a:xfrm>
-      </p:grpSpPr>
-      <p:sp>
-        <p:nvSpPr>
-          <p:cNvPr id="87" name="CustomShape 1"/>
+          <p:cNvPr id="86" name="CustomShape 1"/>
           <p:cNvSpPr/>
           <p:nvPr/>
         </p:nvSpPr>
         <p:spPr>
           <a:xfrm>
             <a:off x="1523880" y="1122480"/>
-            <a:ext cx="9143280" cy="2386800"/>
+            <a:ext cx="9142920" cy="2386440"/>
           </a:xfrm>
           <a:prstGeom prst="rect">
             <a:avLst/>
@@ -4537,6 +4495,7 @@
                   <a:srgbClr val="000000"/>
                 </a:solidFill>
                 <a:latin typeface="Calibri Light"/>
+                <a:ea typeface="DejaVu Sans"/>
               </a:rPr>
               <a:t>Gateway</a:t>
             </a:r>

</xml_diff>